<commit_message>
Rebased from slide master
</commit_message>
<xml_diff>
--- a/week1/IntroToCloudNativeComputing.pptx
+++ b/week1/IntroToCloudNativeComputing.pptx
@@ -109,6 +109,11 @@
       </a:defRPr>
     </a:lvl9pPr>
   </p:defaultTextStyle>
+  <p:extLst>
+    <p:ext uri="{EFAFB233-063F-42B5-8137-9DF3F51BA10A}">
+      <p15:sldGuideLst xmlns:p15="http://schemas.microsoft.com/office/powerpoint/2012/main"/>
+    </p:ext>
+  </p:extLst>
 </p:presentation>
 </file>
 
@@ -2047,7 +2052,7 @@
           <a:solidFill>
             <a:schemeClr val="bg1"/>
           </a:solidFill>
-          <a:latin typeface="Helvetica Neue Medium" panose="02000503000000020004" pitchFamily="2" charset="0"/>
+          <a:latin typeface="Product Sans" panose="020B0403030502040203" pitchFamily="34" charset="0"/>
           <a:ea typeface="Helvetica Neue Medium" panose="02000503000000020004" pitchFamily="2" charset="0"/>
           <a:cs typeface="Helvetica Neue Medium" panose="02000503000000020004" pitchFamily="2" charset="0"/>
         </a:defRPr>

</xml_diff>